<commit_message>
embedd anotated pptx output
</commit_message>
<xml_diff>
--- a/annotated_presentation.pptx
+++ b/annotated_presentation.pptx
@@ -3107,7 +3107,7 @@
       </p:sp>
       <p:pic>
         <p:nvPicPr>
-          <p:cNvPr id="3" name="Picture 2" descr="conveyor_machine.png"/>
+          <p:cNvPr id="3" name="Picture 2" descr="image.png"/>
           <p:cNvPicPr>
             <a:picLocks noChangeAspect="1"/>
           </p:cNvPicPr>
@@ -3121,8 +3121,8 @@
         </p:blipFill>
         <p:spPr>
           <a:xfrm>
-            <a:off x="914400" y="914400"/>
-            <a:ext cx="7315200" cy="4876800"/>
+            <a:off x="2286000" y="1905000"/>
+            <a:ext cx="4572000" cy="3048000"/>
           </a:xfrm>
           <a:prstGeom prst="rect">
             <a:avLst/>
@@ -3137,8 +3137,8 @@
         </p:nvSpPr>
         <p:spPr>
           <a:xfrm>
-            <a:off x="2133600" y="2800350"/>
-            <a:ext cx="1219200" cy="1257300"/>
+            <a:off x="3840480" y="4282440"/>
+            <a:ext cx="350520" cy="541020"/>
           </a:xfrm>
           <a:prstGeom prst="rect">
             <a:avLst/>
@@ -3179,9 +3179,9 @@
           <p:nvPr/>
         </p:nvCxnSpPr>
         <p:spPr>
-          <a:xfrm>
-            <a:off x="3352800.0" y="3429000.0"/>
-            <a:ext cx="3048000.0" cy="0.0"/>
+          <a:xfrm flipV="1">
+            <a:off x="4191000.0" y="3337560.0"/>
+            <a:ext cx="2849880.0" cy="1215390.0"/>
           </a:xfrm>
           <a:prstGeom prst="line">
             <a:avLst/>
@@ -3215,8 +3215,8 @@
         </p:nvSpPr>
         <p:spPr>
           <a:xfrm>
-            <a:off x="6400800" y="2800350"/>
-            <a:ext cx="1828800" cy="457200"/>
+            <a:off x="7040880" y="3108960"/>
+            <a:ext cx="1920240" cy="457200"/>
           </a:xfrm>
           <a:prstGeom prst="rect">
             <a:avLst/>
@@ -3230,119 +3230,10 @@
           <a:lstStyle/>
           <a:p>
             <a:pPr>
-              <a:defRPr sz="2160" b="1"/>
+              <a:defRPr sz="1200" b="1"/>
             </a:pPr>
             <a:r>
-              <a:t>Screw</a:t>
-            </a:r>
-          </a:p>
-        </p:txBody>
-      </p:sp>
-      <p:sp>
-        <p:nvSpPr>
-          <p:cNvPr id="7" name="Rectangle 6"/>
-          <p:cNvSpPr/>
-          <p:nvPr/>
-        </p:nvSpPr>
-        <p:spPr>
-          <a:xfrm>
-            <a:off x="4572000" y="5314950"/>
-            <a:ext cx="1219200" cy="1257300"/>
-          </a:xfrm>
-          <a:prstGeom prst="rect">
-            <a:avLst/>
-          </a:prstGeom>
-          <a:noFill/>
-          <a:ln>
-            <a:solidFill>
-              <a:srgbClr val="FF0000"/>
-            </a:solidFill>
-          </a:ln>
-        </p:spPr>
-        <p:style>
-          <a:lnRef idx="1">
-            <a:schemeClr val="accent1"/>
-          </a:lnRef>
-          <a:fillRef idx="3">
-            <a:schemeClr val="accent1"/>
-          </a:fillRef>
-          <a:effectRef idx="2">
-            <a:schemeClr val="accent1"/>
-          </a:effectRef>
-          <a:fontRef idx="minor">
-            <a:schemeClr val="lt1"/>
-          </a:fontRef>
-        </p:style>
-        <p:txBody>
-          <a:bodyPr rtlCol="0" anchor="ctr"/>
-          <a:lstStyle/>
-          <a:p>
-            <a:pPr algn="ctr"/>
-          </a:p>
-        </p:txBody>
-      </p:sp>
-      <p:cxnSp>
-        <p:nvCxnSpPr>
-          <p:cNvPr id="8" name="Connector 7"/>
-          <p:cNvCxnSpPr/>
-          <p:nvPr/>
-        </p:nvCxnSpPr>
-        <p:spPr>
-          <a:xfrm>
-            <a:off x="5791200.0" y="5943600.0"/>
-            <a:ext cx="609600.0" cy="0.0"/>
-          </a:xfrm>
-          <a:prstGeom prst="line">
-            <a:avLst/>
-          </a:prstGeom>
-          <a:ln>
-            <a:solidFill>
-              <a:srgbClr val="0000FF"/>
-            </a:solidFill>
-          </a:ln>
-        </p:spPr>
-        <p:style>
-          <a:lnRef idx="2">
-            <a:schemeClr val="accent1"/>
-          </a:lnRef>
-          <a:fillRef idx="0">
-            <a:schemeClr val="accent1"/>
-          </a:fillRef>
-          <a:effectRef idx="1">
-            <a:schemeClr val="accent1"/>
-          </a:effectRef>
-          <a:fontRef idx="minor">
-            <a:schemeClr val="tx1"/>
-          </a:fontRef>
-        </p:style>
-      </p:cxnSp>
-      <p:sp>
-        <p:nvSpPr>
-          <p:cNvPr id="9" name="TextBox 8"/>
-          <p:cNvSpPr txBox="1"/>
-          <p:nvPr/>
-        </p:nvSpPr>
-        <p:spPr>
-          <a:xfrm>
-            <a:off x="6400800" y="5314950"/>
-            <a:ext cx="1828800" cy="457200"/>
-          </a:xfrm>
-          <a:prstGeom prst="rect">
-            <a:avLst/>
-          </a:prstGeom>
-          <a:noFill/>
-        </p:spPr>
-        <p:txBody>
-          <a:bodyPr wrap="none">
-            <a:spAutoFit/>
-          </a:bodyPr>
-          <a:lstStyle/>
-          <a:p>
-            <a:pPr>
-              <a:defRPr sz="2160" b="1"/>
-            </a:pPr>
-            <a:r>
-              <a:t>Bolt</a:t>
+              <a:t>Levelling feet</a:t>
             </a:r>
           </a:p>
         </p:txBody>

</xml_diff>